<commit_message>
Partners changed in ppt
</commit_message>
<xml_diff>
--- a/APS.pptx
+++ b/APS.pptx
@@ -10173,7 +10173,7 @@
                         </a:spcAft>
                       </a:pPr>
                       <a:r>
-                        <a:rPr lang="en-GB" sz="1200">
+                        <a:rPr lang="en-GB" sz="1200" dirty="0">
                           <a:solidFill>
                             <a:schemeClr val="accent2"/>
                           </a:solidFill>
@@ -10181,7 +10181,7 @@
                         </a:rPr>
                         <a:t>Checking if list of all possible problems on Serbian roads is made properly</a:t>
                       </a:r>
-                      <a:endParaRPr lang="en-US" sz="1200">
+                      <a:endParaRPr lang="en-US" sz="1200" dirty="0">
                         <a:solidFill>
                           <a:schemeClr val="accent2"/>
                         </a:solidFill>
@@ -14343,11 +14343,6 @@
               </a:rPr>
               <a:t>urope-wide</a:t>
             </a:r>
-            <a:endParaRPr lang="en-GB" dirty="0" smtClean="0">
-              <a:solidFill>
-                <a:schemeClr val="accent2"/>
-              </a:solidFill>
-            </a:endParaRPr>
           </a:p>
           <a:p>
             <a:endParaRPr lang="en-GB" dirty="0" smtClean="0">
@@ -16918,7 +16913,7 @@
             <p:ph idx="1"/>
             <p:extLst>
               <p:ext uri="{D42A27DB-BD31-4B8C-83A1-F6EECF244321}">
-                <p14:modId xmlns:p14="http://schemas.microsoft.com/office/powerpoint/2010/main" val="1385302136"/>
+                <p14:modId xmlns:p14="http://schemas.microsoft.com/office/powerpoint/2010/main" val="3032501504"/>
               </p:ext>
             </p:extLst>
           </p:nvPr>
@@ -17265,7 +17260,7 @@
                         <a:buNone/>
                       </a:pPr>
                       <a:r>
-                        <a:rPr lang="en-GB" sz="1800" b="1" kern="1200" dirty="0">
+                        <a:rPr lang="en-GB" sz="1800" b="1" kern="1200" dirty="0" smtClean="0">
                           <a:solidFill>
                             <a:schemeClr val="accent2">
                               <a:lumMod val="75000"/>
@@ -17275,7 +17270,7 @@
                           <a:ea typeface="Times New Roman" panose="02020603050405020304" pitchFamily="18" charset="0"/>
                           <a:cs typeface="Arial" panose="020B0604020202020204" pitchFamily="34" charset="0"/>
                         </a:rPr>
-                        <a:t>Serbia</a:t>
+                        <a:t>Germany</a:t>
                       </a:r>
                       <a:endParaRPr lang="en-US" sz="1800" b="1" kern="1200" dirty="0">
                         <a:solidFill>
@@ -17439,7 +17434,7 @@
                         <a:buNone/>
                       </a:pPr>
                       <a:r>
-                        <a:rPr lang="en-GB" sz="1800" b="1" kern="1200" dirty="0">
+                        <a:rPr lang="en-GB" sz="1800" b="1" kern="1200" dirty="0" smtClean="0">
                           <a:solidFill>
                             <a:schemeClr val="accent2">
                               <a:lumMod val="75000"/>
@@ -17449,7 +17444,7 @@
                           <a:ea typeface="Times New Roman" panose="02020603050405020304" pitchFamily="18" charset="0"/>
                           <a:cs typeface="Arial" panose="020B0604020202020204" pitchFamily="34" charset="0"/>
                         </a:rPr>
-                        <a:t>Serbia</a:t>
+                        <a:t>Netherlands</a:t>
                       </a:r>
                       <a:endParaRPr lang="en-US" sz="1800" b="1" kern="1200" dirty="0">
                         <a:solidFill>
@@ -25103,12 +25098,12 @@
                         </a:spcAft>
                       </a:pPr>
                       <a:r>
-                        <a:rPr lang="en-GB" sz="1100">
+                        <a:rPr lang="en-GB" sz="1100" dirty="0">
                           <a:effectLst/>
                         </a:rPr>
                         <a:t>Detailed study on road conditions in Serbia</a:t>
                       </a:r>
-                      <a:endParaRPr lang="en-US" sz="1200">
+                      <a:endParaRPr lang="en-US" sz="1200" dirty="0">
                         <a:effectLst/>
                         <a:latin typeface="Times New Roman" panose="02020603050405020304" pitchFamily="18" charset="0"/>
                         <a:ea typeface="Times New Roman" panose="02020603050405020304" pitchFamily="18" charset="0"/>

</xml_diff>